<commit_message>
new file:   ._inShield - FeatureMining.pdf 	modified:   ._inShield - FeatureMining.pptx 	modified:   README.md 	new file:   inShield - FeatureMining.pdf 	modified:   inShield - FeatureMining.pptx
</commit_message>
<xml_diff>
--- a/inShield - FeatureMining.pptx
+++ b/inShield - FeatureMining.pptx
@@ -303,6 +303,14 @@
       </a:defRPr>
     </a:lvl9pPr>
   </p:defaultTextStyle>
+  <p:extLst>
+    <p:ext uri="{EFAFB233-063F-42B5-8137-9DF3F51BA10A}">
+      <p15:sldGuideLst xmlns:p15="http://schemas.microsoft.com/office/powerpoint/2012/main"/>
+    </p:ext>
+    <p:ext uri="{2D200454-40CA-4A62-9FC3-DE9A4176ACB9}">
+      <p15:notesGuideLst xmlns:p15="http://schemas.microsoft.com/office/powerpoint/2012/main"/>
+    </p:ext>
+  </p:extLst>
 </p:presentation>
 </file>
 
@@ -2814,7 +2822,7 @@
           <a:p>
             <a:fld id="{2AFC90C1-6354-254E-AFC1-B5856AA999A3}" type="datetimeFigureOut">
               <a:rPr lang="en-US" smtClean="0"/>
-              <a:t>10/14/23</a:t>
+              <a:t>10/22/23</a:t>
             </a:fld>
             <a:endParaRPr lang="en-US"/>
           </a:p>
@@ -3103,7 +3111,7 @@
           <a:p>
             <a:fld id="{2AFC90C1-6354-254E-AFC1-B5856AA999A3}" type="datetimeFigureOut">
               <a:rPr lang="en-US" smtClean="0"/>
-              <a:t>10/14/23</a:t>
+              <a:t>10/22/23</a:t>
             </a:fld>
             <a:endParaRPr lang="en-US"/>
           </a:p>
@@ -3303,7 +3311,7 @@
           <a:p>
             <a:fld id="{2AFC90C1-6354-254E-AFC1-B5856AA999A3}" type="datetimeFigureOut">
               <a:rPr lang="en-US" smtClean="0"/>
-              <a:t>10/14/23</a:t>
+              <a:t>10/22/23</a:t>
             </a:fld>
             <a:endParaRPr lang="en-US"/>
           </a:p>
@@ -3513,7 +3521,7 @@
           <a:p>
             <a:fld id="{2AFC90C1-6354-254E-AFC1-B5856AA999A3}" type="datetimeFigureOut">
               <a:rPr lang="en-US" smtClean="0"/>
-              <a:t>10/14/23</a:t>
+              <a:t>10/22/23</a:t>
             </a:fld>
             <a:endParaRPr lang="en-US"/>
           </a:p>
@@ -3760,7 +3768,7 @@
           <a:p>
             <a:fld id="{2AFC90C1-6354-254E-AFC1-B5856AA999A3}" type="datetimeFigureOut">
               <a:rPr lang="en-US" smtClean="0"/>
-              <a:t>10/14/23</a:t>
+              <a:t>10/22/23</a:t>
             </a:fld>
             <a:endParaRPr lang="en-US"/>
           </a:p>
@@ -3960,7 +3968,7 @@
           <a:p>
             <a:fld id="{2AFC90C1-6354-254E-AFC1-B5856AA999A3}" type="datetimeFigureOut">
               <a:rPr lang="en-US" smtClean="0"/>
-              <a:t>10/14/23</a:t>
+              <a:t>10/22/23</a:t>
             </a:fld>
             <a:endParaRPr lang="en-US"/>
           </a:p>
@@ -4236,7 +4244,7 @@
           <a:p>
             <a:fld id="{2AFC90C1-6354-254E-AFC1-B5856AA999A3}" type="datetimeFigureOut">
               <a:rPr lang="en-US" smtClean="0"/>
-              <a:t>10/14/23</a:t>
+              <a:t>10/22/23</a:t>
             </a:fld>
             <a:endParaRPr lang="en-US"/>
           </a:p>
@@ -4504,7 +4512,7 @@
           <a:p>
             <a:fld id="{2AFC90C1-6354-254E-AFC1-B5856AA999A3}" type="datetimeFigureOut">
               <a:rPr lang="en-US" smtClean="0"/>
-              <a:t>10/14/23</a:t>
+              <a:t>10/22/23</a:t>
             </a:fld>
             <a:endParaRPr lang="en-US"/>
           </a:p>
@@ -4919,7 +4927,7 @@
           <a:p>
             <a:fld id="{2AFC90C1-6354-254E-AFC1-B5856AA999A3}" type="datetimeFigureOut">
               <a:rPr lang="en-US" smtClean="0"/>
-              <a:t>10/14/23</a:t>
+              <a:t>10/22/23</a:t>
             </a:fld>
             <a:endParaRPr lang="en-US"/>
           </a:p>
@@ -5061,7 +5069,7 @@
           <a:p>
             <a:fld id="{2AFC90C1-6354-254E-AFC1-B5856AA999A3}" type="datetimeFigureOut">
               <a:rPr lang="en-US" smtClean="0"/>
-              <a:t>10/14/23</a:t>
+              <a:t>10/22/23</a:t>
             </a:fld>
             <a:endParaRPr lang="en-US"/>
           </a:p>
@@ -5174,7 +5182,7 @@
           <a:p>
             <a:fld id="{2AFC90C1-6354-254E-AFC1-B5856AA999A3}" type="datetimeFigureOut">
               <a:rPr lang="en-US" smtClean="0"/>
-              <a:t>10/14/23</a:t>
+              <a:t>10/22/23</a:t>
             </a:fld>
             <a:endParaRPr lang="en-US"/>
           </a:p>
@@ -6699,7 +6707,7 @@
           <a:p>
             <a:fld id="{2AFC90C1-6354-254E-AFC1-B5856AA999A3}" type="datetimeFigureOut">
               <a:rPr lang="en-US" smtClean="0"/>
-              <a:t>10/14/23</a:t>
+              <a:t>10/22/23</a:t>
             </a:fld>
             <a:endParaRPr lang="en-US"/>
           </a:p>
@@ -8787,10 +8795,6 @@
               </a:rPr>
               <a:t>by FeatureMining</a:t>
             </a:r>
-            <a:endParaRPr lang="en-MY" sz="2000" b="0" dirty="0">
-              <a:latin typeface="Fira Sans Condensed Medium" panose="020B0603050000020004" pitchFamily="34" charset="0"/>
-              <a:cs typeface="Phosphate Inline" panose="02000506050000020004" pitchFamily="2" charset="77"/>
-            </a:endParaRPr>
           </a:p>
         </p:txBody>
       </p:sp>
@@ -8824,42 +8828,6 @@
           <a:chExt cx="0" cy="0"/>
         </a:xfrm>
       </p:grpSpPr>
-      <p:pic>
-        <p:nvPicPr>
-          <p:cNvPr id="7" name="Graphic 6">
-            <a:extLst>
-              <a:ext uri="{FF2B5EF4-FFF2-40B4-BE49-F238E27FC236}">
-                <a16:creationId xmlns:a16="http://schemas.microsoft.com/office/drawing/2014/main" id="{66478FB6-666B-488E-FE8A-0E464E696B5B}"/>
-              </a:ext>
-            </a:extLst>
-          </p:cNvPr>
-          <p:cNvPicPr>
-            <a:picLocks noChangeAspect="1"/>
-          </p:cNvPicPr>
-          <p:nvPr/>
-        </p:nvPicPr>
-        <p:blipFill>
-          <a:blip r:embed="rId3">
-            <a:extLst>
-              <a:ext uri="{96DAC541-7B7A-43D3-8B79-37D633B846F1}">
-                <asvg:svgBlip xmlns:asvg="http://schemas.microsoft.com/office/drawing/2016/SVG/main" r:embed="rId4"/>
-              </a:ext>
-            </a:extLst>
-          </a:blip>
-          <a:stretch>
-            <a:fillRect/>
-          </a:stretch>
-        </p:blipFill>
-        <p:spPr>
-          <a:xfrm>
-            <a:off x="7283051" y="4456722"/>
-            <a:ext cx="1585762" cy="588945"/>
-          </a:xfrm>
-          <a:prstGeom prst="rect">
-            <a:avLst/>
-          </a:prstGeom>
-        </p:spPr>
-      </p:pic>
       <p:sp>
         <p:nvSpPr>
           <p:cNvPr id="3" name="TextBox 2">
@@ -12933,13 +12901,13 @@
   <p:clrMapOvr>
     <a:masterClrMapping/>
   </p:clrMapOvr>
-  <mc:AlternateContent xmlns:mc="http://schemas.openxmlformats.org/markup-compatibility/2006">
-    <mc:Choice xmlns:p159="http://schemas.microsoft.com/office/powerpoint/2015/09/main" Requires="p159">
+  <mc:AlternateContent xmlns:mc="http://schemas.openxmlformats.org/markup-compatibility/2006" xmlns:p159="http://schemas.microsoft.com/office/powerpoint/2015/09/main">
+    <mc:Choice Requires="p159">
       <p:transition spd="slow">
         <p159:morph option="byObject"/>
       </p:transition>
     </mc:Choice>
-    <mc:Fallback>
+    <mc:Fallback xmlns="">
       <p:transition spd="slow">
         <p:fade/>
       </p:transition>
@@ -12965,42 +12933,6 @@
           <a:chExt cx="0" cy="0"/>
         </a:xfrm>
       </p:grpSpPr>
-      <p:pic>
-        <p:nvPicPr>
-          <p:cNvPr id="7" name="Graphic 6">
-            <a:extLst>
-              <a:ext uri="{FF2B5EF4-FFF2-40B4-BE49-F238E27FC236}">
-                <a16:creationId xmlns:a16="http://schemas.microsoft.com/office/drawing/2014/main" id="{66478FB6-666B-488E-FE8A-0E464E696B5B}"/>
-              </a:ext>
-            </a:extLst>
-          </p:cNvPr>
-          <p:cNvPicPr>
-            <a:picLocks noChangeAspect="1"/>
-          </p:cNvPicPr>
-          <p:nvPr/>
-        </p:nvPicPr>
-        <p:blipFill>
-          <a:blip r:embed="rId3">
-            <a:extLst>
-              <a:ext uri="{96DAC541-7B7A-43D3-8B79-37D633B846F1}">
-                <asvg:svgBlip xmlns:asvg="http://schemas.microsoft.com/office/drawing/2016/SVG/main" r:embed="rId4"/>
-              </a:ext>
-            </a:extLst>
-          </a:blip>
-          <a:stretch>
-            <a:fillRect/>
-          </a:stretch>
-        </p:blipFill>
-        <p:spPr>
-          <a:xfrm>
-            <a:off x="7283051" y="4456722"/>
-            <a:ext cx="1585762" cy="588945"/>
-          </a:xfrm>
-          <a:prstGeom prst="rect">
-            <a:avLst/>
-          </a:prstGeom>
-        </p:spPr>
-      </p:pic>
       <p:sp>
         <p:nvSpPr>
           <p:cNvPr id="26" name="Google Shape;939;p35">
@@ -16943,13 +16875,13 @@
   <p:clrMapOvr>
     <a:masterClrMapping/>
   </p:clrMapOvr>
-  <mc:AlternateContent xmlns:mc="http://schemas.openxmlformats.org/markup-compatibility/2006">
-    <mc:Choice xmlns:p159="http://schemas.microsoft.com/office/powerpoint/2015/09/main" Requires="p159">
+  <mc:AlternateContent xmlns:mc="http://schemas.openxmlformats.org/markup-compatibility/2006" xmlns:p159="http://schemas.microsoft.com/office/powerpoint/2015/09/main">
+    <mc:Choice Requires="p159">
       <p:transition spd="slow">
         <p159:morph option="byObject"/>
       </p:transition>
     </mc:Choice>
-    <mc:Fallback>
+    <mc:Fallback xmlns="">
       <p:transition spd="slow">
         <p:fade/>
       </p:transition>
@@ -20702,20 +20634,20 @@
   <p:clrMapOvr>
     <a:masterClrMapping/>
   </p:clrMapOvr>
-  <mc:AlternateContent xmlns:mc="http://schemas.openxmlformats.org/markup-compatibility/2006">
-    <mc:Choice xmlns:p159="http://schemas.microsoft.com/office/powerpoint/2015/09/main" Requires="p159">
+  <mc:AlternateContent xmlns:mc="http://schemas.openxmlformats.org/markup-compatibility/2006" xmlns:p159="http://schemas.microsoft.com/office/powerpoint/2015/09/main">
+    <mc:Choice Requires="p159">
       <p:transition spd="slow">
         <p159:morph option="byObject"/>
       </p:transition>
     </mc:Choice>
-    <mc:Fallback>
+    <mc:Fallback xmlns="">
       <p:transition spd="slow">
         <p:fade/>
       </p:transition>
     </mc:Fallback>
   </mc:AlternateContent>
-  <mc:AlternateContent xmlns:mc="http://schemas.openxmlformats.org/markup-compatibility/2006">
-    <mc:Choice xmlns:p14="http://schemas.microsoft.com/office/powerpoint/2010/main" Requires="p14">
+  <mc:AlternateContent xmlns:mc="http://schemas.openxmlformats.org/markup-compatibility/2006" xmlns:p14="http://schemas.microsoft.com/office/powerpoint/2010/main">
+    <mc:Choice Requires="p14">
       <p:timing>
         <p:tnLst>
           <p:par>
@@ -20786,7 +20718,7 @@
         </p:tnLst>
       </p:timing>
     </mc:Choice>
-    <mc:Fallback>
+    <mc:Fallback xmlns="">
       <p:timing>
         <p:tnLst>
           <p:par>
@@ -23882,13 +23814,13 @@
   <p:clrMapOvr>
     <a:masterClrMapping/>
   </p:clrMapOvr>
-  <mc:AlternateContent xmlns:mc="http://schemas.openxmlformats.org/markup-compatibility/2006">
-    <mc:Choice xmlns:p159="http://schemas.microsoft.com/office/powerpoint/2015/09/main" Requires="p159">
+  <mc:AlternateContent xmlns:mc="http://schemas.openxmlformats.org/markup-compatibility/2006" xmlns:p159="http://schemas.microsoft.com/office/powerpoint/2015/09/main">
+    <mc:Choice Requires="p159">
       <p:transition spd="slow">
         <p159:morph option="byObject"/>
       </p:transition>
     </mc:Choice>
-    <mc:Fallback>
+    <mc:Fallback xmlns="">
       <p:transition spd="slow">
         <p:fade/>
       </p:transition>
@@ -28918,13 +28850,13 @@
   <p:clrMapOvr>
     <a:masterClrMapping/>
   </p:clrMapOvr>
-  <mc:AlternateContent xmlns:mc="http://schemas.openxmlformats.org/markup-compatibility/2006">
-    <mc:Choice xmlns:p159="http://schemas.microsoft.com/office/powerpoint/2015/09/main" Requires="p159">
+  <mc:AlternateContent xmlns:mc="http://schemas.openxmlformats.org/markup-compatibility/2006" xmlns:p159="http://schemas.microsoft.com/office/powerpoint/2015/09/main">
+    <mc:Choice Requires="p159">
       <p:transition spd="slow">
         <p159:morph option="byObject"/>
       </p:transition>
     </mc:Choice>
-    <mc:Fallback>
+    <mc:Fallback xmlns="">
       <p:transition spd="slow">
         <p:fade/>
       </p:transition>
@@ -33974,13 +33906,13 @@
   <p:clrMapOvr>
     <a:masterClrMapping/>
   </p:clrMapOvr>
-  <mc:AlternateContent xmlns:mc="http://schemas.openxmlformats.org/markup-compatibility/2006">
-    <mc:Choice xmlns:p159="http://schemas.microsoft.com/office/powerpoint/2015/09/main" Requires="p159">
+  <mc:AlternateContent xmlns:mc="http://schemas.openxmlformats.org/markup-compatibility/2006" xmlns:p159="http://schemas.microsoft.com/office/powerpoint/2015/09/main">
+    <mc:Choice Requires="p159">
       <p:transition spd="slow">
         <p159:morph option="byObject"/>
       </p:transition>
     </mc:Choice>
-    <mc:Fallback>
+    <mc:Fallback xmlns="">
       <p:transition spd="slow">
         <p:fade/>
       </p:transition>
@@ -39375,13 +39307,13 @@
   <p:clrMapOvr>
     <a:masterClrMapping/>
   </p:clrMapOvr>
-  <mc:AlternateContent xmlns:mc="http://schemas.openxmlformats.org/markup-compatibility/2006">
-    <mc:Choice xmlns:p159="http://schemas.microsoft.com/office/powerpoint/2015/09/main" Requires="p159">
+  <mc:AlternateContent xmlns:mc="http://schemas.openxmlformats.org/markup-compatibility/2006" xmlns:p159="http://schemas.microsoft.com/office/powerpoint/2015/09/main">
+    <mc:Choice Requires="p159">
       <p:transition spd="slow">
         <p159:morph option="byObject"/>
       </p:transition>
     </mc:Choice>
-    <mc:Fallback>
+    <mc:Fallback xmlns="">
       <p:transition spd="slow">
         <p:fade/>
       </p:transition>

</xml_diff>